<commit_message>
code for writing spacy to file
</commit_message>
<xml_diff>
--- a/cstahl_ehirsch_kfarmer_poster.pptx
+++ b/cstahl_ehirsch_kfarmer_poster.pptx
@@ -3635,21 +3635,21 @@
                   <a:latin typeface="Avenir Book"/>
                   <a:cs typeface="Avenir Book"/>
                 </a:rPr>
-                <a:t>is a website that strives to connect people from different backgrounds to be able to answer questions whose answers are "either locked in people’s heads, or only accessible to select groups" \cite{</a:t>
+                <a:t>is a website that strives to connect people from different backgrounds to be able to answer questions whose answers are "either locked in people’s heads, or only accessible to select groups" </a:t>
               </a:r>
               <a:r>
-                <a:rPr lang="en-US" sz="2400" dirty="0" err="1">
+                <a:rPr lang="en-US" sz="2400" dirty="0" smtClean="0">
                   <a:latin typeface="Avenir Book"/>
                   <a:cs typeface="Avenir Book"/>
                 </a:rPr>
-                <a:t>quora</a:t>
+                <a:t>[1]. </a:t>
               </a:r>
               <a:r>
                 <a:rPr lang="en-US" sz="2400" dirty="0">
                   <a:latin typeface="Avenir Book"/>
                   <a:cs typeface="Avenir Book"/>
                 </a:rPr>
-                <a:t>}. \_\_How popular?\_\_ Once these questions are answered, any other person should be able to find the responses. However, sometimes people are unable to find the questions they want and end up asking the same question again. This counteracts </a:t>
+                <a:t>\_\_How popular?\_\_ Once these questions are answered, any other person should be able to find the responses. However, sometimes people are unable to find the questions they want and end up asking the same question again. This counteracts </a:t>
               </a:r>
               <a:r>
                 <a:rPr lang="en-US" sz="2400" dirty="0" err="1">
@@ -3663,22 +3663,19 @@
                   <a:latin typeface="Avenir Book"/>
                   <a:cs typeface="Avenir Book"/>
                 </a:rPr>
-                <a:t> vision of having "only one version of each question\dots [not] a left wing version, a right wing version, a western version, and an eastern version"~\cite{</a:t>
+                <a:t> vision of having "only one version of each question\dots [not] a left wing version, a right wing version, a western version, and an eastern </a:t>
               </a:r>
               <a:r>
-                <a:rPr lang="en-US" sz="2400" dirty="0" err="1">
+                <a:rPr lang="en-US" sz="2400" dirty="0" smtClean="0">
                   <a:latin typeface="Avenir Book"/>
                   <a:cs typeface="Avenir Book"/>
                 </a:rPr>
-                <a:t>quora</a:t>
+                <a:t>version” [1].</a:t>
               </a:r>
-              <a:r>
-                <a:rPr lang="en-US" sz="2400" dirty="0">
-                  <a:latin typeface="Avenir Book"/>
-                  <a:cs typeface="Avenir Book"/>
-                </a:rPr>
-                <a:t>}.</a:t>
-              </a:r>
+              <a:endParaRPr lang="en-US" sz="2400" dirty="0">
+                <a:latin typeface="Avenir Book"/>
+                <a:cs typeface="Avenir Book"/>
+              </a:endParaRPr>
             </a:p>
           </p:txBody>
         </p:sp>
@@ -3809,6 +3806,31 @@
           </a:bodyPr>
           <a:lstStyle/>
           <a:p>
+            <a:pPr marL="457200" indent="-457200">
+              <a:buFont typeface="+mj-lt"/>
+              <a:buAutoNum type="arabicPeriod"/>
+            </a:pPr>
+            <a:r>
+              <a:rPr lang="en-US" sz="2000" dirty="0">
+                <a:latin typeface="Avenir Book"/>
+                <a:cs typeface="Avenir Book"/>
+              </a:rPr>
+              <a:t>https://</a:t>
+            </a:r>
+            <a:r>
+              <a:rPr lang="en-US" sz="2000" dirty="0" err="1">
+                <a:latin typeface="Avenir Book"/>
+                <a:cs typeface="Avenir Book"/>
+              </a:rPr>
+              <a:t>www.quora.com</a:t>
+            </a:r>
+            <a:r>
+              <a:rPr lang="en-US" sz="2000" dirty="0">
+                <a:latin typeface="Avenir Book"/>
+                <a:cs typeface="Avenir Book"/>
+              </a:rPr>
+              <a:t>/about</a:t>
+            </a:r>
             <a:endParaRPr lang="en-US" sz="2000" dirty="0" smtClean="0">
               <a:latin typeface="Avenir Book"/>
               <a:cs typeface="Avenir Book"/>
@@ -4478,8 +4500,8 @@
         </p:nvSpPr>
         <p:spPr>
           <a:xfrm>
-            <a:off x="12433258" y="7017700"/>
-            <a:ext cx="11709485" cy="3182410"/>
+            <a:off x="12433259" y="7017700"/>
+            <a:ext cx="11709484" cy="3182410"/>
           </a:xfrm>
           <a:prstGeom prst="rect">
             <a:avLst/>
@@ -4515,7 +4537,7 @@
                 <a:latin typeface="Avenir Book"/>
                 <a:cs typeface="Avenir Book"/>
               </a:rPr>
-              <a:t>Most non-duplicates are near-duplicates.</a:t>
+              <a:t>Most non-duplicates are near-duplicates, and \_\_percentage\_\_</a:t>
             </a:r>
           </a:p>
           <a:p>
@@ -4631,12 +4653,70 @@
                 <a:latin typeface="Avenir Book"/>
                 <a:cs typeface="Avenir Book"/>
               </a:rPr>
-              <a:t>2,345,806 pairs, </a:t>
+              <a:t>2,345,806 pairs, \_\_#dups, percentage\_\_</a:t>
             </a:r>
             <a:endParaRPr lang="en-US" sz="2400" dirty="0">
               <a:latin typeface="Avenir Book"/>
               <a:cs typeface="Avenir Book"/>
             </a:endParaRPr>
+          </a:p>
+        </p:txBody>
+      </p:sp>
+      <p:sp>
+        <p:nvSpPr>
+          <p:cNvPr id="33" name="TextBox 32"/>
+          <p:cNvSpPr txBox="1"/>
+          <p:nvPr/>
+        </p:nvSpPr>
+        <p:spPr>
+          <a:xfrm>
+            <a:off x="25482823" y="6979224"/>
+            <a:ext cx="9524360" cy="966418"/>
+          </a:xfrm>
+          <a:prstGeom prst="rect">
+            <a:avLst/>
+          </a:prstGeom>
+          <a:noFill/>
+        </p:spPr>
+        <p:txBody>
+          <a:bodyPr wrap="square" rtlCol="0">
+            <a:spAutoFit/>
+          </a:bodyPr>
+          <a:lstStyle/>
+          <a:p>
+            <a:pPr>
+              <a:lnSpc>
+                <a:spcPct val="120000"/>
+              </a:lnSpc>
+            </a:pPr>
+            <a:r>
+              <a:rPr lang="en-US" sz="2400" dirty="0" smtClean="0">
+                <a:latin typeface="Avenir Book"/>
+                <a:cs typeface="Avenir Book"/>
+              </a:rPr>
+              <a:t>, </a:t>
+            </a:r>
+            <a:r>
+              <a:rPr lang="en-US" sz="2400" dirty="0">
+                <a:latin typeface="Avenir Book"/>
+                <a:cs typeface="Avenir Book"/>
+              </a:rPr>
+              <a:t>a right wing version, a western version, and an eastern version"~\cite{</a:t>
+            </a:r>
+            <a:r>
+              <a:rPr lang="en-US" sz="2400" dirty="0" err="1">
+                <a:latin typeface="Avenir Book"/>
+                <a:cs typeface="Avenir Book"/>
+              </a:rPr>
+              <a:t>quora</a:t>
+            </a:r>
+            <a:r>
+              <a:rPr lang="en-US" sz="2400" dirty="0">
+                <a:latin typeface="Avenir Book"/>
+                <a:cs typeface="Avenir Book"/>
+              </a:rPr>
+              <a:t>}.</a:t>
+            </a:r>
           </a:p>
         </p:txBody>
       </p:sp>

</xml_diff>